<commit_message>
Updated decision tree lecture
</commit_message>
<xml_diff>
--- a/Sklearn/CART/images/RandomForest.pptx
+++ b/Sklearn/CART/images/RandomForest.pptx
@@ -5,7 +5,7 @@
     <p:sldMasterId id="2147483648" r:id="rId1"/>
   </p:sldMasterIdLst>
   <p:notesMasterIdLst>
-    <p:notesMasterId r:id="rId15"/>
+    <p:notesMasterId r:id="rId16"/>
   </p:notesMasterIdLst>
   <p:sldIdLst>
     <p:sldId id="256" r:id="rId2"/>
@@ -21,6 +21,7 @@
     <p:sldId id="410" r:id="rId12"/>
     <p:sldId id="413" r:id="rId13"/>
     <p:sldId id="416" r:id="rId14"/>
+    <p:sldId id="417" r:id="rId15"/>
   </p:sldIdLst>
   <p:sldSz cx="12192000" cy="6858000"/>
   <p:notesSz cx="6858000" cy="9144000"/>
@@ -209,7 +210,7 @@
           <a:p>
             <a:fld id="{BF3E0636-8A2E-4043-881A-1014A5CF3828}" type="datetimeFigureOut">
               <a:rPr lang="en-US" smtClean="0"/>
-              <a:t>3/10/20</a:t>
+              <a:t>12/2/23</a:t>
             </a:fld>
             <a:endParaRPr lang="en-US"/>
           </a:p>
@@ -2232,7 +2233,7 @@
           <a:p>
             <a:fld id="{F863BEF8-C8D8-2848-8261-78C146860174}" type="datetimeFigureOut">
               <a:rPr lang="en-US" smtClean="0"/>
-              <a:t>3/10/20</a:t>
+              <a:t>12/2/23</a:t>
             </a:fld>
             <a:endParaRPr lang="en-US"/>
           </a:p>
@@ -2400,7 +2401,7 @@
           <a:p>
             <a:fld id="{F863BEF8-C8D8-2848-8261-78C146860174}" type="datetimeFigureOut">
               <a:rPr lang="en-US" smtClean="0"/>
-              <a:t>3/10/20</a:t>
+              <a:t>12/2/23</a:t>
             </a:fld>
             <a:endParaRPr lang="en-US"/>
           </a:p>
@@ -2578,7 +2579,7 @@
           <a:p>
             <a:fld id="{F863BEF8-C8D8-2848-8261-78C146860174}" type="datetimeFigureOut">
               <a:rPr lang="en-US" smtClean="0"/>
-              <a:t>3/10/20</a:t>
+              <a:t>12/2/23</a:t>
             </a:fld>
             <a:endParaRPr lang="en-US"/>
           </a:p>
@@ -2746,7 +2747,7 @@
           <a:p>
             <a:fld id="{F863BEF8-C8D8-2848-8261-78C146860174}" type="datetimeFigureOut">
               <a:rPr lang="en-US" smtClean="0"/>
-              <a:t>3/10/20</a:t>
+              <a:t>12/2/23</a:t>
             </a:fld>
             <a:endParaRPr lang="en-US"/>
           </a:p>
@@ -2991,7 +2992,7 @@
           <a:p>
             <a:fld id="{F863BEF8-C8D8-2848-8261-78C146860174}" type="datetimeFigureOut">
               <a:rPr lang="en-US" smtClean="0"/>
-              <a:t>3/10/20</a:t>
+              <a:t>12/2/23</a:t>
             </a:fld>
             <a:endParaRPr lang="en-US"/>
           </a:p>
@@ -3220,7 +3221,7 @@
           <a:p>
             <a:fld id="{F863BEF8-C8D8-2848-8261-78C146860174}" type="datetimeFigureOut">
               <a:rPr lang="en-US" smtClean="0"/>
-              <a:t>3/10/20</a:t>
+              <a:t>12/2/23</a:t>
             </a:fld>
             <a:endParaRPr lang="en-US"/>
           </a:p>
@@ -3584,7 +3585,7 @@
           <a:p>
             <a:fld id="{F863BEF8-C8D8-2848-8261-78C146860174}" type="datetimeFigureOut">
               <a:rPr lang="en-US" smtClean="0"/>
-              <a:t>3/10/20</a:t>
+              <a:t>12/2/23</a:t>
             </a:fld>
             <a:endParaRPr lang="en-US"/>
           </a:p>
@@ -3701,7 +3702,7 @@
           <a:p>
             <a:fld id="{F863BEF8-C8D8-2848-8261-78C146860174}" type="datetimeFigureOut">
               <a:rPr lang="en-US" smtClean="0"/>
-              <a:t>3/10/20</a:t>
+              <a:t>12/2/23</a:t>
             </a:fld>
             <a:endParaRPr lang="en-US"/>
           </a:p>
@@ -3796,7 +3797,7 @@
           <a:p>
             <a:fld id="{F863BEF8-C8D8-2848-8261-78C146860174}" type="datetimeFigureOut">
               <a:rPr lang="en-US" smtClean="0"/>
-              <a:t>3/10/20</a:t>
+              <a:t>12/2/23</a:t>
             </a:fld>
             <a:endParaRPr lang="en-US"/>
           </a:p>
@@ -4071,7 +4072,7 @@
           <a:p>
             <a:fld id="{F863BEF8-C8D8-2848-8261-78C146860174}" type="datetimeFigureOut">
               <a:rPr lang="en-US" smtClean="0"/>
-              <a:t>3/10/20</a:t>
+              <a:t>12/2/23</a:t>
             </a:fld>
             <a:endParaRPr lang="en-US"/>
           </a:p>
@@ -4323,7 +4324,7 @@
           <a:p>
             <a:fld id="{F863BEF8-C8D8-2848-8261-78C146860174}" type="datetimeFigureOut">
               <a:rPr lang="en-US" smtClean="0"/>
-              <a:t>3/10/20</a:t>
+              <a:t>12/2/23</a:t>
             </a:fld>
             <a:endParaRPr lang="en-US"/>
           </a:p>
@@ -4534,7 +4535,7 @@
           <a:p>
             <a:fld id="{F863BEF8-C8D8-2848-8261-78C146860174}" type="datetimeFigureOut">
               <a:rPr lang="en-US" smtClean="0"/>
-              <a:t>3/10/20</a:t>
+              <a:t>12/2/23</a:t>
             </a:fld>
             <a:endParaRPr lang="en-US"/>
           </a:p>
@@ -6261,6 +6262,65 @@
     <p:extLst>
       <p:ext uri="{BB962C8B-B14F-4D97-AF65-F5344CB8AC3E}">
         <p14:creationId xmlns:p14="http://schemas.microsoft.com/office/powerpoint/2010/main" val="473785466"/>
+      </p:ext>
+    </p:extLst>
+  </p:cSld>
+  <p:clrMapOvr>
+    <a:masterClrMapping/>
+  </p:clrMapOvr>
+</p:sld>
+</file>
+
+<file path=ppt/slides/slide14.xml><?xml version="1.0" encoding="utf-8"?>
+<p:sld xmlns:a="http://schemas.openxmlformats.org/drawingml/2006/main" xmlns:r="http://schemas.openxmlformats.org/officeDocument/2006/relationships" xmlns:p="http://schemas.openxmlformats.org/presentationml/2006/main">
+  <p:cSld>
+    <p:spTree>
+      <p:nvGrpSpPr>
+        <p:cNvPr id="1" name=""/>
+        <p:cNvGrpSpPr/>
+        <p:nvPr/>
+      </p:nvGrpSpPr>
+      <p:grpSpPr>
+        <a:xfrm>
+          <a:off x="0" y="0"/>
+          <a:ext cx="0" cy="0"/>
+          <a:chOff x="0" y="0"/>
+          <a:chExt cx="0" cy="0"/>
+        </a:xfrm>
+      </p:grpSpPr>
+      <p:pic>
+        <p:nvPicPr>
+          <p:cNvPr id="5" name="Content Placeholder 4" descr="A screenshot of a computer&#10;&#10;Description automatically generated">
+            <a:extLst>
+              <a:ext uri="{FF2B5EF4-FFF2-40B4-BE49-F238E27FC236}">
+                <a16:creationId xmlns:a16="http://schemas.microsoft.com/office/drawing/2014/main" id="{2FF1C02B-C970-0749-35A5-2FB0F9D3CAA5}"/>
+              </a:ext>
+            </a:extLst>
+          </p:cNvPr>
+          <p:cNvPicPr>
+            <a:picLocks noGrp="1" noChangeAspect="1"/>
+          </p:cNvPicPr>
+          <p:nvPr>
+            <p:ph idx="1"/>
+          </p:nvPr>
+        </p:nvPicPr>
+        <p:blipFill>
+          <a:blip r:embed="rId2"/>
+          <a:stretch>
+            <a:fillRect/>
+          </a:stretch>
+        </p:blipFill>
+        <p:spPr>
+          <a:xfrm>
+            <a:off x="2276384" y="1825625"/>
+            <a:ext cx="7639232" cy="4351338"/>
+          </a:xfrm>
+        </p:spPr>
+      </p:pic>
+    </p:spTree>
+    <p:extLst>
+      <p:ext uri="{BB962C8B-B14F-4D97-AF65-F5344CB8AC3E}">
+        <p14:creationId xmlns:p14="http://schemas.microsoft.com/office/powerpoint/2010/main" val="4128413774"/>
       </p:ext>
     </p:extLst>
   </p:cSld>

</xml_diff>